<commit_message>
Riesgos agregados en el tablero de control
</commit_message>
<xml_diff>
--- a/trunk/docs/Entregables/Tablero de control/GRUPO 5508 - SAFE - Tablero de control integral - UTN - v1.1.pptx
+++ b/trunk/docs/Entregables/Tablero de control/GRUPO 5508 - SAFE - Tablero de control integral - UTN - v1.1.pptx
@@ -106,6 +106,22 @@
       </a:defRPr>
     </a:lvl9pPr>
   </p:defaultTextStyle>
+  <p:extLst>
+    <p:ext uri="{EFAFB233-063F-42B5-8137-9DF3F51BA10A}">
+      <p15:sldGuideLst xmlns:p15="http://schemas.microsoft.com/office/powerpoint/2012/main">
+        <p15:guide id="1" orient="horz" pos="2160">
+          <p15:clr>
+            <a:srgbClr val="A4A3A4"/>
+          </p15:clr>
+        </p15:guide>
+        <p15:guide id="2" pos="2880">
+          <p15:clr>
+            <a:srgbClr val="A4A3A4"/>
+          </p15:clr>
+        </p15:guide>
+      </p15:sldGuideLst>
+    </p:ext>
+  </p:extLst>
 </p:presentation>
 </file>
 
@@ -290,7 +306,7 @@
           <a:p>
             <a:fld id="{8A2493BC-3794-4994-AF1C-9EDE0D76EB28}" type="datetimeFigureOut">
               <a:rPr lang="en-US" smtClean="0"/>
-              <a:t>5/20/2016</a:t>
+              <a:t>5/24/2016</a:t>
             </a:fld>
             <a:endParaRPr lang="en-US"/>
           </a:p>
@@ -460,7 +476,7 @@
           <a:p>
             <a:fld id="{8A2493BC-3794-4994-AF1C-9EDE0D76EB28}" type="datetimeFigureOut">
               <a:rPr lang="en-US" smtClean="0"/>
-              <a:t>5/20/2016</a:t>
+              <a:t>5/24/2016</a:t>
             </a:fld>
             <a:endParaRPr lang="en-US"/>
           </a:p>
@@ -640,7 +656,7 @@
           <a:p>
             <a:fld id="{8A2493BC-3794-4994-AF1C-9EDE0D76EB28}" type="datetimeFigureOut">
               <a:rPr lang="en-US" smtClean="0"/>
-              <a:t>5/20/2016</a:t>
+              <a:t>5/24/2016</a:t>
             </a:fld>
             <a:endParaRPr lang="en-US"/>
           </a:p>
@@ -810,7 +826,7 @@
           <a:p>
             <a:fld id="{8A2493BC-3794-4994-AF1C-9EDE0D76EB28}" type="datetimeFigureOut">
               <a:rPr lang="en-US" smtClean="0"/>
-              <a:t>5/20/2016</a:t>
+              <a:t>5/24/2016</a:t>
             </a:fld>
             <a:endParaRPr lang="en-US"/>
           </a:p>
@@ -1056,7 +1072,7 @@
           <a:p>
             <a:fld id="{8A2493BC-3794-4994-AF1C-9EDE0D76EB28}" type="datetimeFigureOut">
               <a:rPr lang="en-US" smtClean="0"/>
-              <a:t>5/20/2016</a:t>
+              <a:t>5/24/2016</a:t>
             </a:fld>
             <a:endParaRPr lang="en-US"/>
           </a:p>
@@ -1344,7 +1360,7 @@
           <a:p>
             <a:fld id="{8A2493BC-3794-4994-AF1C-9EDE0D76EB28}" type="datetimeFigureOut">
               <a:rPr lang="en-US" smtClean="0"/>
-              <a:t>5/20/2016</a:t>
+              <a:t>5/24/2016</a:t>
             </a:fld>
             <a:endParaRPr lang="en-US"/>
           </a:p>
@@ -1766,7 +1782,7 @@
           <a:p>
             <a:fld id="{8A2493BC-3794-4994-AF1C-9EDE0D76EB28}" type="datetimeFigureOut">
               <a:rPr lang="en-US" smtClean="0"/>
-              <a:t>5/20/2016</a:t>
+              <a:t>5/24/2016</a:t>
             </a:fld>
             <a:endParaRPr lang="en-US"/>
           </a:p>
@@ -1884,7 +1900,7 @@
           <a:p>
             <a:fld id="{8A2493BC-3794-4994-AF1C-9EDE0D76EB28}" type="datetimeFigureOut">
               <a:rPr lang="en-US" smtClean="0"/>
-              <a:t>5/20/2016</a:t>
+              <a:t>5/24/2016</a:t>
             </a:fld>
             <a:endParaRPr lang="en-US"/>
           </a:p>
@@ -1979,7 +1995,7 @@
           <a:p>
             <a:fld id="{8A2493BC-3794-4994-AF1C-9EDE0D76EB28}" type="datetimeFigureOut">
               <a:rPr lang="en-US" smtClean="0"/>
-              <a:t>5/20/2016</a:t>
+              <a:t>5/24/2016</a:t>
             </a:fld>
             <a:endParaRPr lang="en-US"/>
           </a:p>
@@ -2256,7 +2272,7 @@
           <a:p>
             <a:fld id="{8A2493BC-3794-4994-AF1C-9EDE0D76EB28}" type="datetimeFigureOut">
               <a:rPr lang="en-US" smtClean="0"/>
-              <a:t>5/20/2016</a:t>
+              <a:t>5/24/2016</a:t>
             </a:fld>
             <a:endParaRPr lang="en-US"/>
           </a:p>
@@ -2509,7 +2525,7 @@
           <a:p>
             <a:fld id="{8A2493BC-3794-4994-AF1C-9EDE0D76EB28}" type="datetimeFigureOut">
               <a:rPr lang="en-US" smtClean="0"/>
-              <a:t>5/20/2016</a:t>
+              <a:t>5/24/2016</a:t>
             </a:fld>
             <a:endParaRPr lang="en-US"/>
           </a:p>
@@ -2722,7 +2738,7 @@
           <a:p>
             <a:fld id="{8A2493BC-3794-4994-AF1C-9EDE0D76EB28}" type="datetimeFigureOut">
               <a:rPr lang="en-US" smtClean="0"/>
-              <a:t>5/20/2016</a:t>
+              <a:t>5/24/2016</a:t>
             </a:fld>
             <a:endParaRPr lang="en-US"/>
           </a:p>
@@ -3243,11 +3259,41 @@
                 <a:tableStyleId>{F5AB1C69-6EDB-4FF4-983F-18BD219EF322}</a:tableStyleId>
               </a:tblPr>
               <a:tblGrid>
-                <a:gridCol w="1221366"/>
-                <a:gridCol w="1279527"/>
-                <a:gridCol w="1279527"/>
-                <a:gridCol w="1046886"/>
-                <a:gridCol w="1221366"/>
+                <a:gridCol w="1221366">
+                  <a:extLst>
+                    <a:ext uri="{9D8B030D-6E8A-4147-A177-3AD203B41FA5}">
+                      <a16:colId xmlns:a16="http://schemas.microsoft.com/office/drawing/2014/main" val="20000"/>
+                    </a:ext>
+                  </a:extLst>
+                </a:gridCol>
+                <a:gridCol w="1279527">
+                  <a:extLst>
+                    <a:ext uri="{9D8B030D-6E8A-4147-A177-3AD203B41FA5}">
+                      <a16:colId xmlns:a16="http://schemas.microsoft.com/office/drawing/2014/main" val="20001"/>
+                    </a:ext>
+                  </a:extLst>
+                </a:gridCol>
+                <a:gridCol w="1279527">
+                  <a:extLst>
+                    <a:ext uri="{9D8B030D-6E8A-4147-A177-3AD203B41FA5}">
+                      <a16:colId xmlns:a16="http://schemas.microsoft.com/office/drawing/2014/main" val="20002"/>
+                    </a:ext>
+                  </a:extLst>
+                </a:gridCol>
+                <a:gridCol w="1046886">
+                  <a:extLst>
+                    <a:ext uri="{9D8B030D-6E8A-4147-A177-3AD203B41FA5}">
+                      <a16:colId xmlns:a16="http://schemas.microsoft.com/office/drawing/2014/main" val="20003"/>
+                    </a:ext>
+                  </a:extLst>
+                </a:gridCol>
+                <a:gridCol w="1221366">
+                  <a:extLst>
+                    <a:ext uri="{9D8B030D-6E8A-4147-A177-3AD203B41FA5}">
+                      <a16:colId xmlns:a16="http://schemas.microsoft.com/office/drawing/2014/main" val="20004"/>
+                    </a:ext>
+                  </a:extLst>
+                </a:gridCol>
               </a:tblGrid>
               <a:tr h="370840">
                 <a:tc>
@@ -3430,35 +3476,8 @@
                           <a:ea typeface="ＭＳ Ｐゴシック"/>
                           <a:cs typeface="ＭＳ Ｐゴシック"/>
                         </a:rPr>
-                        <a:t>P. </a:t>
+                        <a:t>P. Abramowicz</a:t>
                       </a:r>
-                      <a:r>
-                        <a:rPr kumimoji="0" lang="it-IT" sz="1050" b="0" i="0" u="none" strike="noStrike" cap="none" normalizeH="0" baseline="0" dirty="0" smtClean="0">
-                          <a:ln>
-                            <a:noFill/>
-                          </a:ln>
-                          <a:solidFill>
-                            <a:srgbClr val="1F497D"/>
-                          </a:solidFill>
-                          <a:effectLst/>
-                          <a:latin typeface="TheSansCorrespondence" pitchFamily="34" charset="0"/>
-                          <a:ea typeface="ＭＳ Ｐゴシック"/>
-                          <a:cs typeface="ＭＳ Ｐゴシック"/>
-                        </a:rPr>
-                        <a:t>Abramowicz</a:t>
-                      </a:r>
-                      <a:endParaRPr kumimoji="0" lang="it-IT" sz="1050" b="0" i="0" u="none" strike="noStrike" cap="none" normalizeH="0" baseline="0" dirty="0" smtClean="0">
-                        <a:ln>
-                          <a:noFill/>
-                        </a:ln>
-                        <a:solidFill>
-                          <a:srgbClr val="1F497D"/>
-                        </a:solidFill>
-                        <a:effectLst/>
-                        <a:latin typeface="TheSansCorrespondence" pitchFamily="34" charset="0"/>
-                        <a:ea typeface="ＭＳ Ｐゴシック"/>
-                        <a:cs typeface="ＭＳ Ｐゴシック"/>
-                      </a:endParaRPr>
                     </a:p>
                   </a:txBody>
                   <a:tcPr marL="0" marR="0" marT="36000" marB="36000" anchor="ctr" anchorCtr="1">
@@ -4347,6 +4366,11 @@
                     </a:solidFill>
                   </a:tcPr>
                 </a:tc>
+                <a:extLst>
+                  <a:ext uri="{0D108BD9-81ED-4DB2-BD59-A6C34878D82A}">
+                    <a16:rowId xmlns:a16="http://schemas.microsoft.com/office/drawing/2014/main" val="10000"/>
+                  </a:ext>
+                </a:extLst>
               </a:tr>
             </a:tbl>
           </a:graphicData>
@@ -4371,11 +4395,41 @@
                 <a:tableStyleId>{F5AB1C69-6EDB-4FF4-983F-18BD219EF322}</a:tableStyleId>
               </a:tblPr>
               <a:tblGrid>
-                <a:gridCol w="1287790"/>
-                <a:gridCol w="1287790"/>
-                <a:gridCol w="1229253"/>
-                <a:gridCol w="1053619"/>
-                <a:gridCol w="1190220"/>
+                <a:gridCol w="1287790">
+                  <a:extLst>
+                    <a:ext uri="{9D8B030D-6E8A-4147-A177-3AD203B41FA5}">
+                      <a16:colId xmlns:a16="http://schemas.microsoft.com/office/drawing/2014/main" val="20000"/>
+                    </a:ext>
+                  </a:extLst>
+                </a:gridCol>
+                <a:gridCol w="1287790">
+                  <a:extLst>
+                    <a:ext uri="{9D8B030D-6E8A-4147-A177-3AD203B41FA5}">
+                      <a16:colId xmlns:a16="http://schemas.microsoft.com/office/drawing/2014/main" val="20001"/>
+                    </a:ext>
+                  </a:extLst>
+                </a:gridCol>
+                <a:gridCol w="1229253">
+                  <a:extLst>
+                    <a:ext uri="{9D8B030D-6E8A-4147-A177-3AD203B41FA5}">
+                      <a16:colId xmlns:a16="http://schemas.microsoft.com/office/drawing/2014/main" val="20002"/>
+                    </a:ext>
+                  </a:extLst>
+                </a:gridCol>
+                <a:gridCol w="1053619">
+                  <a:extLst>
+                    <a:ext uri="{9D8B030D-6E8A-4147-A177-3AD203B41FA5}">
+                      <a16:colId xmlns:a16="http://schemas.microsoft.com/office/drawing/2014/main" val="20003"/>
+                    </a:ext>
+                  </a:extLst>
+                </a:gridCol>
+                <a:gridCol w="1190220">
+                  <a:extLst>
+                    <a:ext uri="{9D8B030D-6E8A-4147-A177-3AD203B41FA5}">
+                      <a16:colId xmlns:a16="http://schemas.microsoft.com/office/drawing/2014/main" val="20004"/>
+                    </a:ext>
+                  </a:extLst>
+                </a:gridCol>
               </a:tblGrid>
               <a:tr h="370840">
                 <a:tc>
@@ -4694,6 +4748,11 @@
                     </a:solidFill>
                   </a:tcPr>
                 </a:tc>
+                <a:extLst>
+                  <a:ext uri="{0D108BD9-81ED-4DB2-BD59-A6C34878D82A}">
+                    <a16:rowId xmlns:a16="http://schemas.microsoft.com/office/drawing/2014/main" val="10000"/>
+                  </a:ext>
+                </a:extLst>
               </a:tr>
             </a:tbl>
           </a:graphicData>
@@ -7208,11 +7267,17 @@
               <a:buChar char="-"/>
             </a:pPr>
             <a:r>
-              <a:rPr lang="es-AR" sz="1000" dirty="0"/>
+              <a:rPr lang="es-AR" sz="1000" dirty="0">
+                <a:latin typeface="Arial" panose="020B0604020202020204" pitchFamily="34" charset="0"/>
+                <a:cs typeface="Arial" panose="020B0604020202020204" pitchFamily="34" charset="0"/>
+              </a:rPr>
               <a:t>Proveer métricas de avance a los docentes para facilitar el seguimiento y </a:t>
             </a:r>
             <a:r>
-              <a:rPr lang="es-AR" sz="1000" dirty="0" smtClean="0"/>
+              <a:rPr lang="es-AR" sz="1000" dirty="0" smtClean="0">
+                <a:latin typeface="Arial" panose="020B0604020202020204" pitchFamily="34" charset="0"/>
+                <a:cs typeface="Arial" panose="020B0604020202020204" pitchFamily="34" charset="0"/>
+              </a:rPr>
               <a:t>control.</a:t>
             </a:r>
           </a:p>
@@ -7222,11 +7287,17 @@
               <a:buChar char="-"/>
             </a:pPr>
             <a:r>
-              <a:rPr lang="es-AR" sz="1000" dirty="0"/>
+              <a:rPr lang="es-AR" sz="1000" dirty="0">
+                <a:latin typeface="Arial" panose="020B0604020202020204" pitchFamily="34" charset="0"/>
+                <a:cs typeface="Arial" panose="020B0604020202020204" pitchFamily="34" charset="0"/>
+              </a:rPr>
               <a:t>Facilitar a los docentes la gestión de actividades y el cronograma </a:t>
             </a:r>
             <a:r>
-              <a:rPr lang="es-AR" sz="1000" dirty="0" smtClean="0"/>
+              <a:rPr lang="es-AR" sz="1000" dirty="0" smtClean="0">
+                <a:latin typeface="Arial" panose="020B0604020202020204" pitchFamily="34" charset="0"/>
+                <a:cs typeface="Arial" panose="020B0604020202020204" pitchFamily="34" charset="0"/>
+              </a:rPr>
               <a:t>.</a:t>
             </a:r>
           </a:p>
@@ -7236,11 +7307,17 @@
               <a:buChar char="-"/>
             </a:pPr>
             <a:r>
-              <a:rPr lang="es-AR" sz="1000" dirty="0"/>
+              <a:rPr lang="es-AR" sz="1000" dirty="0">
+                <a:latin typeface="Arial" panose="020B0604020202020204" pitchFamily="34" charset="0"/>
+                <a:cs typeface="Arial" panose="020B0604020202020204" pitchFamily="34" charset="0"/>
+              </a:rPr>
               <a:t>Proveer un repositorio centralizado de </a:t>
             </a:r>
             <a:r>
-              <a:rPr lang="es-AR" sz="1000" dirty="0" smtClean="0"/>
+              <a:rPr lang="es-AR" sz="1000" dirty="0" smtClean="0">
+                <a:latin typeface="Arial" panose="020B0604020202020204" pitchFamily="34" charset="0"/>
+                <a:cs typeface="Arial" panose="020B0604020202020204" pitchFamily="34" charset="0"/>
+              </a:rPr>
               <a:t>contenidos.</a:t>
             </a:r>
           </a:p>
@@ -7250,14 +7327,153 @@
               <a:buChar char="-"/>
             </a:pPr>
             <a:r>
-              <a:rPr lang="es-AR" sz="1000" dirty="0"/>
+              <a:rPr lang="es-AR" sz="1000" dirty="0">
+                <a:latin typeface="Arial" panose="020B0604020202020204" pitchFamily="34" charset="0"/>
+                <a:cs typeface="Arial" panose="020B0604020202020204" pitchFamily="34" charset="0"/>
+              </a:rPr>
               <a:t>Informar periódicamente a docentes y tutores sobre el avance de los </a:t>
             </a:r>
             <a:r>
-              <a:rPr lang="es-AR" sz="1000" dirty="0" smtClean="0"/>
+              <a:rPr lang="es-AR" sz="1000" dirty="0" smtClean="0">
+                <a:latin typeface="Arial" panose="020B0604020202020204" pitchFamily="34" charset="0"/>
+                <a:cs typeface="Arial" panose="020B0604020202020204" pitchFamily="34" charset="0"/>
+              </a:rPr>
               <a:t>alumnos.</a:t>
             </a:r>
             <a:endParaRPr lang="en-US" sz="1000" dirty="0">
+              <a:latin typeface="Arial" panose="020B0604020202020204" pitchFamily="34" charset="0"/>
+              <a:cs typeface="Arial" panose="020B0604020202020204" pitchFamily="34" charset="0"/>
+            </a:endParaRPr>
+          </a:p>
+        </p:txBody>
+      </p:sp>
+      <p:sp>
+        <p:nvSpPr>
+          <p:cNvPr id="45" name="TextBox 44"/>
+          <p:cNvSpPr txBox="1"/>
+          <p:nvPr/>
+        </p:nvSpPr>
+        <p:spPr>
+          <a:xfrm>
+            <a:off x="5639420" y="1102230"/>
+            <a:ext cx="3205485" cy="1308050"/>
+          </a:xfrm>
+          <a:prstGeom prst="rect">
+            <a:avLst/>
+          </a:prstGeom>
+          <a:noFill/>
+        </p:spPr>
+        <p:txBody>
+          <a:bodyPr wrap="square" rtlCol="0">
+            <a:spAutoFit/>
+          </a:bodyPr>
+          <a:lstStyle/>
+          <a:p>
+            <a:pPr marL="171450" indent="-171450">
+              <a:buFontTx/>
+              <a:buChar char="-"/>
+            </a:pPr>
+            <a:r>
+              <a:rPr lang="es-AR" sz="1000" dirty="0" smtClean="0">
+                <a:latin typeface="Arial" panose="020B0604020202020204" pitchFamily="34" charset="0"/>
+                <a:cs typeface="Arial" panose="020B0604020202020204" pitchFamily="34" charset="0"/>
+              </a:rPr>
+              <a:t>En el caso de que exista </a:t>
+            </a:r>
+            <a:r>
+              <a:rPr lang="es-AR" sz="1000" smtClean="0">
+                <a:latin typeface="Arial" panose="020B0604020202020204" pitchFamily="34" charset="0"/>
+                <a:cs typeface="Arial" panose="020B0604020202020204" pitchFamily="34" charset="0"/>
+              </a:rPr>
+              <a:t>un recorte de </a:t>
+            </a:r>
+            <a:r>
+              <a:rPr lang="es-AR" sz="1000" dirty="0">
+                <a:latin typeface="Arial" panose="020B0604020202020204" pitchFamily="34" charset="0"/>
+                <a:cs typeface="Arial" panose="020B0604020202020204" pitchFamily="34" charset="0"/>
+              </a:rPr>
+              <a:t>calendario, entonces el proyecto podría sufrir una reestructuración</a:t>
+            </a:r>
+            <a:r>
+              <a:rPr lang="es-AR" sz="1000" dirty="0" smtClean="0">
+                <a:latin typeface="Arial" panose="020B0604020202020204" pitchFamily="34" charset="0"/>
+                <a:cs typeface="Arial" panose="020B0604020202020204" pitchFamily="34" charset="0"/>
+              </a:rPr>
+              <a:t>. </a:t>
+            </a:r>
+            <a:r>
+              <a:rPr lang="es-AR" sz="1000" dirty="0">
+                <a:latin typeface="Arial" pitchFamily="34" charset="0"/>
+                <a:cs typeface="Arial" pitchFamily="34" charset="0"/>
+              </a:rPr>
+              <a:t>(</a:t>
+            </a:r>
+            <a:r>
+              <a:rPr lang="es-AR" sz="1000" dirty="0" smtClean="0">
+                <a:latin typeface="Arial" pitchFamily="34" charset="0"/>
+                <a:cs typeface="Arial" pitchFamily="34" charset="0"/>
+              </a:rPr>
+              <a:t>Impacto Medio. </a:t>
+            </a:r>
+            <a:r>
+              <a:rPr lang="es-AR" sz="1000" dirty="0">
+                <a:latin typeface="Arial" pitchFamily="34" charset="0"/>
+                <a:cs typeface="Arial" pitchFamily="34" charset="0"/>
+              </a:rPr>
+              <a:t>Probabilidad de </a:t>
+            </a:r>
+            <a:r>
+              <a:rPr lang="es-AR" sz="1000" dirty="0" smtClean="0">
+                <a:latin typeface="Arial" pitchFamily="34" charset="0"/>
+                <a:cs typeface="Arial" pitchFamily="34" charset="0"/>
+              </a:rPr>
+              <a:t>Ocurrencia Media)</a:t>
+            </a:r>
+          </a:p>
+          <a:p>
+            <a:pPr marL="171450" indent="-171450">
+              <a:buFontTx/>
+              <a:buChar char="-"/>
+            </a:pPr>
+            <a:r>
+              <a:rPr lang="es-AR" sz="1000" dirty="0">
+                <a:latin typeface="Arial" panose="020B0604020202020204" pitchFamily="34" charset="0"/>
+                <a:cs typeface="Arial" panose="020B0604020202020204" pitchFamily="34" charset="0"/>
+              </a:rPr>
+              <a:t>Aparición de empresa con pretensiones de imitar el modelo de negocio</a:t>
+            </a:r>
+            <a:r>
+              <a:rPr lang="es-AR" sz="1000" dirty="0" smtClean="0">
+                <a:latin typeface="Arial" panose="020B0604020202020204" pitchFamily="34" charset="0"/>
+                <a:cs typeface="Arial" panose="020B0604020202020204" pitchFamily="34" charset="0"/>
+              </a:rPr>
+              <a:t>. (</a:t>
+            </a:r>
+            <a:r>
+              <a:rPr lang="es-AR" sz="1000" dirty="0">
+                <a:latin typeface="Arial" pitchFamily="34" charset="0"/>
+                <a:cs typeface="Arial" pitchFamily="34" charset="0"/>
+              </a:rPr>
+              <a:t>Impacto Medio. Probabilidad de Ocurrencia </a:t>
+            </a:r>
+            <a:r>
+              <a:rPr lang="es-AR" sz="1000" dirty="0" smtClean="0">
+                <a:latin typeface="Arial" pitchFamily="34" charset="0"/>
+                <a:cs typeface="Arial" pitchFamily="34" charset="0"/>
+              </a:rPr>
+              <a:t>Baja)</a:t>
+            </a:r>
+            <a:endParaRPr lang="es-AR" sz="1000" dirty="0">
+              <a:latin typeface="Arial" pitchFamily="34" charset="0"/>
+              <a:cs typeface="Arial" pitchFamily="34" charset="0"/>
+            </a:endParaRPr>
+          </a:p>
+          <a:p>
+            <a:pPr marL="171450" indent="-171450">
+              <a:buFontTx/>
+              <a:buChar char="-"/>
+            </a:pPr>
+            <a:endParaRPr lang="en-US" sz="900" dirty="0">
               <a:latin typeface="Arial" panose="020B0604020202020204" pitchFamily="34" charset="0"/>
               <a:cs typeface="Arial" panose="020B0604020202020204" pitchFamily="34" charset="0"/>
             </a:endParaRPr>

</xml_diff>

<commit_message>
ultimo arreglo tablero de control
</commit_message>
<xml_diff>
--- a/trunk/docs/Entregables/Tablero de control/GRUPO 5508 - SAFE - Tablero de control integral - UTN - v1.1.pptx
+++ b/trunk/docs/Entregables/Tablero de control/GRUPO 5508 - SAFE - Tablero de control integral - UTN - v1.1.pptx
@@ -7356,7 +7356,7 @@
         <p:spPr>
           <a:xfrm>
             <a:off x="5639420" y="1102230"/>
-            <a:ext cx="3205485" cy="1308050"/>
+            <a:ext cx="3205485" cy="1769715"/>
           </a:xfrm>
           <a:prstGeom prst="rect">
             <a:avLst/>
@@ -7378,14 +7378,7 @@
                 <a:latin typeface="Arial" panose="020B0604020202020204" pitchFamily="34" charset="0"/>
                 <a:cs typeface="Arial" panose="020B0604020202020204" pitchFamily="34" charset="0"/>
               </a:rPr>
-              <a:t>En el caso de que exista </a:t>
-            </a:r>
-            <a:r>
-              <a:rPr lang="es-AR" sz="1000" smtClean="0">
-                <a:latin typeface="Arial" panose="020B0604020202020204" pitchFamily="34" charset="0"/>
-                <a:cs typeface="Arial" panose="020B0604020202020204" pitchFamily="34" charset="0"/>
-              </a:rPr>
-              <a:t>un recorte de </a:t>
+              <a:t>En el caso de que exista un recorte de </a:t>
             </a:r>
             <a:r>
               <a:rPr lang="es-AR" sz="1000" dirty="0">
@@ -7461,8 +7454,80 @@
                 <a:latin typeface="Arial" pitchFamily="34" charset="0"/>
                 <a:cs typeface="Arial" pitchFamily="34" charset="0"/>
               </a:rPr>
-              <a:t>Baja)</a:t>
-            </a:r>
+              <a:t>Baja</a:t>
+            </a:r>
+            <a:r>
+              <a:rPr lang="es-AR" sz="1000" dirty="0" smtClean="0">
+                <a:latin typeface="Arial" pitchFamily="34" charset="0"/>
+                <a:cs typeface="Arial" pitchFamily="34" charset="0"/>
+              </a:rPr>
+              <a:t>)</a:t>
+            </a:r>
+          </a:p>
+          <a:p>
+            <a:pPr marL="171450" indent="-171450">
+              <a:buFontTx/>
+              <a:buChar char="-"/>
+            </a:pPr>
+            <a:r>
+              <a:rPr lang="es-AR" sz="1000" dirty="0">
+                <a:latin typeface="Arial" panose="020B0604020202020204" pitchFamily="34" charset="0"/>
+                <a:cs typeface="Arial" panose="020B0604020202020204" pitchFamily="34" charset="0"/>
+              </a:rPr>
+              <a:t>Falta de Experiencia de programadores </a:t>
+            </a:r>
+            <a:r>
+              <a:rPr lang="es-AR" sz="1000" dirty="0" smtClean="0">
+                <a:latin typeface="Arial" panose="020B0604020202020204" pitchFamily="34" charset="0"/>
+                <a:cs typeface="Arial" panose="020B0604020202020204" pitchFamily="34" charset="0"/>
+              </a:rPr>
+              <a:t>JAVA </a:t>
+            </a:r>
+            <a:r>
+              <a:rPr lang="es-AR" sz="1000" dirty="0">
+                <a:latin typeface="Arial" panose="020B0604020202020204" pitchFamily="34" charset="0"/>
+                <a:cs typeface="Arial" panose="020B0604020202020204" pitchFamily="34" charset="0"/>
+              </a:rPr>
+              <a:t>. (Impacto </a:t>
+            </a:r>
+            <a:r>
+              <a:rPr lang="es-AR" sz="1000" dirty="0" smtClean="0">
+                <a:latin typeface="Arial" panose="020B0604020202020204" pitchFamily="34" charset="0"/>
+                <a:cs typeface="Arial" panose="020B0604020202020204" pitchFamily="34" charset="0"/>
+              </a:rPr>
+              <a:t>Alto. </a:t>
+            </a:r>
+            <a:r>
+              <a:rPr lang="es-AR" sz="1000" dirty="0">
+                <a:latin typeface="Arial" panose="020B0604020202020204" pitchFamily="34" charset="0"/>
+                <a:cs typeface="Arial" panose="020B0604020202020204" pitchFamily="34" charset="0"/>
+              </a:rPr>
+              <a:t>Probabilidad de </a:t>
+            </a:r>
+            <a:r>
+              <a:rPr lang="es-AR" sz="1000">
+                <a:latin typeface="Arial" panose="020B0604020202020204" pitchFamily="34" charset="0"/>
+                <a:cs typeface="Arial" panose="020B0604020202020204" pitchFamily="34" charset="0"/>
+              </a:rPr>
+              <a:t>Ocurrencia </a:t>
+            </a:r>
+            <a:r>
+              <a:rPr lang="es-AR" sz="1000" smtClean="0">
+                <a:latin typeface="Arial" panose="020B0604020202020204" pitchFamily="34" charset="0"/>
+                <a:cs typeface="Arial" panose="020B0604020202020204" pitchFamily="34" charset="0"/>
+              </a:rPr>
+              <a:t>Media)</a:t>
+            </a:r>
+            <a:endParaRPr lang="es-AR" sz="1000" dirty="0">
+              <a:latin typeface="Arial" panose="020B0604020202020204" pitchFamily="34" charset="0"/>
+              <a:cs typeface="Arial" panose="020B0604020202020204" pitchFamily="34" charset="0"/>
+            </a:endParaRPr>
+          </a:p>
+          <a:p>
+            <a:pPr marL="171450" indent="-171450">
+              <a:buFontTx/>
+              <a:buChar char="-"/>
+            </a:pPr>
             <a:endParaRPr lang="es-AR" sz="1000" dirty="0">
               <a:latin typeface="Arial" pitchFamily="34" charset="0"/>
               <a:cs typeface="Arial" pitchFamily="34" charset="0"/>

</xml_diff>